<commit_message>
Text paste support, updates to pptx
</commit_message>
<xml_diff>
--- a/talks/entdev170222/EntDev170222_MSLovesLinux.pptx
+++ b/talks/entdev170222/EntDev170222_MSLovesLinux.pptx
@@ -217,7 +217,7 @@
           <a:p>
             <a:fld id="{FF887124-A3AA-467C-B375-1690662688A0}" type="datetimeFigureOut">
               <a:rPr lang="en-US" smtClean="0"/>
-              <a:t>2/9/2017</a:t>
+              <a:t>2/12/2017</a:t>
             </a:fld>
             <a:endParaRPr lang="en-US"/>
           </a:p>
@@ -312,7 +312,6 @@
               <a:rPr lang="en-US"/>
               <a:t>Fifth level</a:t>
             </a:r>
-            <a:endParaRPr lang="en-US"/>
           </a:p>
         </p:txBody>
       </p:sp>
@@ -577,7 +576,18 @@
               <a:rPr lang="hu-HU" dirty="0" err="1"/>
               <a:t>devices</a:t>
             </a:r>
-            <a:endParaRPr lang="en-US" dirty="0"/>
+            <a:r>
+              <a:rPr lang="en-US" dirty="0"/>
+              <a:t>, </a:t>
+            </a:r>
+            <a:r>
+              <a:rPr lang="en-US" dirty="0" err="1"/>
+              <a:t>lsb_release</a:t>
+            </a:r>
+            <a:r>
+              <a:rPr lang="en-US" dirty="0"/>
+              <a:t>, mount</a:t>
+            </a:r>
           </a:p>
           <a:p>
             <a:r>
@@ -674,8 +684,41 @@
           </a:p>
           <a:p>
             <a:r>
+              <a:rPr lang="en-US" dirty="0"/>
+              <a:t>Demo1:</a:t>
+            </a:r>
+          </a:p>
+          <a:p>
+            <a:r>
+              <a:rPr lang="en-US" dirty="0"/>
+              <a:t>- </a:t>
+            </a:r>
+            <a:r>
+              <a:rPr lang="en-US" dirty="0" err="1"/>
+              <a:t>Strace</a:t>
+            </a:r>
+            <a:r>
+              <a:rPr lang="en-US" dirty="0"/>
+              <a:t> </a:t>
+            </a:r>
+            <a:r>
+              <a:rPr lang="en-US" dirty="0" err="1"/>
+              <a:t>mplayer</a:t>
+            </a:r>
+            <a:endParaRPr lang="en-US" dirty="0"/>
+          </a:p>
+          <a:p>
+            <a:r>
+              <a:rPr lang="hu-HU" dirty="0" err="1"/>
+              <a:t>Demo</a:t>
+            </a:r>
+            <a:r>
+              <a:rPr lang="en-US" dirty="0"/>
+              <a:t>2</a:t>
+            </a:r>
+            <a:r>
               <a:rPr lang="hu-HU" dirty="0"/>
-              <a:t>Demo1:</a:t>
+              <a:t>:</a:t>
             </a:r>
           </a:p>
           <a:p>
@@ -699,7 +742,7 @@
             </a:pPr>
             <a:r>
               <a:rPr lang="en-US" dirty="0"/>
-              <a:t>Demo2:</a:t>
+              <a:t>Demo3:</a:t>
             </a:r>
           </a:p>
           <a:p>
@@ -904,7 +947,7 @@
           <a:p>
             <a:fld id="{20E7F039-6ACC-45DB-B329-DF29D647B5FB}" type="datetimeFigureOut">
               <a:rPr lang="en-US" smtClean="0"/>
-              <a:t>2/9/2017</a:t>
+              <a:t>2/12/2017</a:t>
             </a:fld>
             <a:endParaRPr lang="en-US"/>
           </a:p>
@@ -1072,7 +1115,7 @@
           <a:p>
             <a:fld id="{20E7F039-6ACC-45DB-B329-DF29D647B5FB}" type="datetimeFigureOut">
               <a:rPr lang="en-US" smtClean="0"/>
-              <a:t>2/9/2017</a:t>
+              <a:t>2/12/2017</a:t>
             </a:fld>
             <a:endParaRPr lang="en-US"/>
           </a:p>
@@ -1250,7 +1293,7 @@
           <a:p>
             <a:fld id="{20E7F039-6ACC-45DB-B329-DF29D647B5FB}" type="datetimeFigureOut">
               <a:rPr lang="en-US" smtClean="0"/>
-              <a:t>2/9/2017</a:t>
+              <a:t>2/12/2017</a:t>
             </a:fld>
             <a:endParaRPr lang="en-US"/>
           </a:p>
@@ -1418,7 +1461,7 @@
           <a:p>
             <a:fld id="{20E7F039-6ACC-45DB-B329-DF29D647B5FB}" type="datetimeFigureOut">
               <a:rPr lang="en-US" smtClean="0"/>
-              <a:t>2/9/2017</a:t>
+              <a:t>2/12/2017</a:t>
             </a:fld>
             <a:endParaRPr lang="en-US"/>
           </a:p>
@@ -1663,7 +1706,7 @@
           <a:p>
             <a:fld id="{20E7F039-6ACC-45DB-B329-DF29D647B5FB}" type="datetimeFigureOut">
               <a:rPr lang="en-US" smtClean="0"/>
-              <a:t>2/9/2017</a:t>
+              <a:t>2/12/2017</a:t>
             </a:fld>
             <a:endParaRPr lang="en-US"/>
           </a:p>
@@ -1892,7 +1935,7 @@
           <a:p>
             <a:fld id="{20E7F039-6ACC-45DB-B329-DF29D647B5FB}" type="datetimeFigureOut">
               <a:rPr lang="en-US" smtClean="0"/>
-              <a:t>2/9/2017</a:t>
+              <a:t>2/12/2017</a:t>
             </a:fld>
             <a:endParaRPr lang="en-US"/>
           </a:p>
@@ -2256,7 +2299,7 @@
           <a:p>
             <a:fld id="{20E7F039-6ACC-45DB-B329-DF29D647B5FB}" type="datetimeFigureOut">
               <a:rPr lang="en-US" smtClean="0"/>
-              <a:t>2/9/2017</a:t>
+              <a:t>2/12/2017</a:t>
             </a:fld>
             <a:endParaRPr lang="en-US"/>
           </a:p>
@@ -2373,7 +2416,7 @@
           <a:p>
             <a:fld id="{20E7F039-6ACC-45DB-B329-DF29D647B5FB}" type="datetimeFigureOut">
               <a:rPr lang="en-US" smtClean="0"/>
-              <a:t>2/9/2017</a:t>
+              <a:t>2/12/2017</a:t>
             </a:fld>
             <a:endParaRPr lang="en-US"/>
           </a:p>
@@ -2468,7 +2511,7 @@
           <a:p>
             <a:fld id="{20E7F039-6ACC-45DB-B329-DF29D647B5FB}" type="datetimeFigureOut">
               <a:rPr lang="en-US" smtClean="0"/>
-              <a:t>2/9/2017</a:t>
+              <a:t>2/12/2017</a:t>
             </a:fld>
             <a:endParaRPr lang="en-US"/>
           </a:p>
@@ -2743,7 +2786,7 @@
           <a:p>
             <a:fld id="{20E7F039-6ACC-45DB-B329-DF29D647B5FB}" type="datetimeFigureOut">
               <a:rPr lang="en-US" smtClean="0"/>
-              <a:t>2/9/2017</a:t>
+              <a:t>2/12/2017</a:t>
             </a:fld>
             <a:endParaRPr lang="en-US"/>
           </a:p>
@@ -2995,7 +3038,7 @@
           <a:p>
             <a:fld id="{20E7F039-6ACC-45DB-B329-DF29D647B5FB}" type="datetimeFigureOut">
               <a:rPr lang="en-US" smtClean="0"/>
-              <a:t>2/9/2017</a:t>
+              <a:t>2/12/2017</a:t>
             </a:fld>
             <a:endParaRPr lang="en-US"/>
           </a:p>
@@ -3206,7 +3249,7 @@
           <a:p>
             <a:fld id="{20E7F039-6ACC-45DB-B329-DF29D647B5FB}" type="datetimeFigureOut">
               <a:rPr lang="en-US" smtClean="0"/>
-              <a:t>2/9/2017</a:t>
+              <a:t>2/12/2017</a:t>
             </a:fld>
             <a:endParaRPr lang="en-US"/>
           </a:p>
@@ -4656,8 +4699,8 @@
         </p:nvSpPr>
         <p:spPr>
           <a:xfrm>
-            <a:off x="9160778" y="1828800"/>
-            <a:ext cx="2324611" cy="923330"/>
+            <a:off x="9046478" y="1847850"/>
+            <a:ext cx="3002232" cy="1477328"/>
           </a:xfrm>
           <a:prstGeom prst="rect">
             <a:avLst/>
@@ -4669,6 +4712,23 @@
             <a:spAutoFit/>
           </a:bodyPr>
           <a:lstStyle/>
+          <a:p>
+            <a:r>
+              <a:rPr lang="hu-HU" dirty="0"/>
+              <a:t>Unix/Linux: </a:t>
+            </a:r>
+            <a:r>
+              <a:rPr lang="hu-HU" dirty="0" err="1"/>
+              <a:t>Everything</a:t>
+            </a:r>
+            <a:r>
+              <a:rPr lang="hu-HU" dirty="0"/>
+              <a:t> is a file</a:t>
+            </a:r>
+          </a:p>
+          <a:p>
+            <a:endParaRPr lang="hu-HU" dirty="0"/>
+          </a:p>
           <a:p>
             <a:r>
               <a:rPr lang="hu-HU" dirty="0"/>
@@ -4905,7 +4965,11 @@
             </a:r>
             <a:r>
               <a:rPr lang="en-US" dirty="0"/>
-              <a:t> party X server and export DISPLAY</a:t>
+              <a:t> party X server and </a:t>
+            </a:r>
+            <a:r>
+              <a:rPr lang="en-US" i="1" dirty="0"/>
+              <a:t>export DISPLAY</a:t>
             </a:r>
           </a:p>
           <a:p>
@@ -4992,7 +5056,7 @@
         <p:spPr/>
         <p:txBody>
           <a:bodyPr>
-            <a:normAutofit lnSpcReduction="10000"/>
+            <a:normAutofit/>
           </a:bodyPr>
           <a:lstStyle/>
           <a:p>
@@ -5002,10 +5066,52 @@
             </a:r>
           </a:p>
           <a:p>
+            <a:r>
+              <a:rPr lang="en-US" dirty="0"/>
+              <a:t>Extends LWS with some features</a:t>
+            </a:r>
+          </a:p>
+          <a:p>
             <a:pPr lvl="1"/>
             <a:r>
               <a:rPr lang="en-US" dirty="0"/>
-              <a:t>Extends LWS with some features</a:t>
+              <a:t>Graphics via Framebuffer</a:t>
+            </a:r>
+          </a:p>
+          <a:p>
+            <a:pPr lvl="1"/>
+            <a:r>
+              <a:rPr lang="en-US" dirty="0"/>
+              <a:t>PCM Sound</a:t>
+            </a:r>
+          </a:p>
+          <a:p>
+            <a:pPr lvl="1"/>
+            <a:r>
+              <a:rPr lang="en-US" dirty="0"/>
+              <a:t>X</a:t>
+            </a:r>
+          </a:p>
+          <a:p>
+            <a:pPr lvl="1"/>
+            <a:r>
+              <a:rPr lang="en-US" dirty="0"/>
+              <a:t>Mouse (and Keyboard) handling for X</a:t>
+            </a:r>
+          </a:p>
+          <a:p>
+            <a:pPr lvl="1"/>
+            <a:r>
+              <a:rPr lang="en-US" dirty="0"/>
+              <a:t>No need for 3</a:t>
+            </a:r>
+            <a:r>
+              <a:rPr lang="en-US" baseline="30000" dirty="0"/>
+              <a:t>rd</a:t>
+            </a:r>
+            <a:r>
+              <a:rPr lang="en-US" dirty="0"/>
+              <a:t> party X server</a:t>
             </a:r>
           </a:p>
           <a:p>
@@ -5024,53 +5130,8 @@
             </a:r>
           </a:p>
           <a:p>
-            <a:r>
-              <a:rPr lang="en-US" dirty="0"/>
-              <a:t>Features:</a:t>
-            </a:r>
-          </a:p>
-          <a:p>
             <a:pPr lvl="1"/>
-            <a:r>
-              <a:rPr lang="en-US" dirty="0"/>
-              <a:t>Graphics via Framebuffer</a:t>
-            </a:r>
-          </a:p>
-          <a:p>
-            <a:pPr lvl="1"/>
-            <a:r>
-              <a:rPr lang="en-US" dirty="0"/>
-              <a:t>PCM Sound</a:t>
-            </a:r>
-          </a:p>
-          <a:p>
-            <a:pPr lvl="1"/>
-            <a:r>
-              <a:rPr lang="en-US" dirty="0"/>
-              <a:t>X</a:t>
-            </a:r>
-          </a:p>
-          <a:p>
-            <a:pPr lvl="1"/>
-            <a:r>
-              <a:rPr lang="en-US" dirty="0"/>
-              <a:t>Mouse (and Keyboard) handling for X</a:t>
-            </a:r>
-          </a:p>
-          <a:p>
-            <a:pPr lvl="1"/>
-            <a:r>
-              <a:rPr lang="en-US" dirty="0"/>
-              <a:t>No need for 3</a:t>
-            </a:r>
-            <a:r>
-              <a:rPr lang="en-US" baseline="30000" dirty="0"/>
-              <a:t>rd</a:t>
-            </a:r>
-            <a:r>
-              <a:rPr lang="en-US" dirty="0"/>
-              <a:t> party X server</a:t>
-            </a:r>
+            <a:endParaRPr lang="en-US" dirty="0"/>
           </a:p>
         </p:txBody>
       </p:sp>
@@ -5230,12 +5291,14 @@
         </p:nvSpPr>
         <p:spPr/>
         <p:txBody>
-          <a:bodyPr/>
-          <a:lstStyle/>
-          <a:p>
-            <a:r>
-              <a:rPr lang="en-US" dirty="0"/>
-              <a:t>Creates missing device files</a:t>
+          <a:bodyPr>
+            <a:normAutofit fontScale="92500" lnSpcReduction="10000"/>
+          </a:bodyPr>
+          <a:lstStyle/>
+          <a:p>
+            <a:r>
+              <a:rPr lang="en-US" dirty="0"/>
+              <a:t>Creates missing device files on demand</a:t>
             </a:r>
           </a:p>
           <a:p>
@@ -5258,7 +5321,7 @@
             </a:r>
             <a:r>
               <a:rPr lang="en-US" dirty="0"/>
-              <a:t>/pcmC0D0, /dev/input/mice</a:t>
+              <a:t>/pcmC0D0p, /dev/input/mice</a:t>
             </a:r>
           </a:p>
           <a:p>
@@ -5274,6 +5337,13 @@
             <a:endParaRPr lang="en-US" dirty="0"/>
           </a:p>
           <a:p>
+            <a:pPr lvl="1"/>
+            <a:r>
+              <a:rPr lang="en-US" dirty="0"/>
+              <a:t>Goal: real file handle</a:t>
+            </a:r>
+          </a:p>
+          <a:p>
             <a:r>
               <a:rPr lang="en-US" dirty="0"/>
               <a:t>Attaches to the remote process as a debugger – </a:t>
@@ -5314,8 +5384,13 @@
             </a:r>
             <a:r>
               <a:rPr lang="en-US" dirty="0"/>
-              <a:t> for the above device files</a:t>
-            </a:r>
+              <a:t> for the above device files via </a:t>
+            </a:r>
+            <a:r>
+              <a:rPr lang="en-US" dirty="0" err="1"/>
+              <a:t>ptrace</a:t>
+            </a:r>
+            <a:endParaRPr lang="en-US" dirty="0"/>
           </a:p>
           <a:p>
             <a:pPr lvl="1"/>
@@ -5343,7 +5418,7 @@
           <a:p>
             <a:r>
               <a:rPr lang="en-US" dirty="0"/>
-              <a:t>Forwards operations, data to a WPF process via network sockets</a:t>
+              <a:t>Forwards operations, data to a WPF process via network sockets, process responses</a:t>
             </a:r>
           </a:p>
         </p:txBody>
@@ -5530,7 +5605,7 @@
         <p:spPr>
           <a:xfrm>
             <a:off x="2072081" y="4681056"/>
-            <a:ext cx="914400" cy="914400"/>
+            <a:ext cx="1089130" cy="914400"/>
           </a:xfrm>
           <a:prstGeom prst="rect">
             <a:avLst/>
@@ -5559,7 +5634,7 @@
             <a:pPr algn="ctr"/>
             <a:r>
               <a:rPr lang="en-US" dirty="0"/>
-              <a:t>X App, WM</a:t>
+              <a:t>X App, Window Manager</a:t>
             </a:r>
           </a:p>
         </p:txBody>
@@ -5679,6 +5754,7 @@
         <p:nvCxnSpPr>
           <p:cNvPr id="21" name="Straight Connector 20"/>
           <p:cNvCxnSpPr>
+            <a:cxnSpLocks/>
             <a:stCxn id="11" idx="0"/>
             <a:endCxn id="10" idx="2"/>
           </p:cNvCxnSpPr>
@@ -5687,7 +5763,7 @@
         <p:spPr>
           <a:xfrm flipH="1" flipV="1">
             <a:off x="1740716" y="4026715"/>
-            <a:ext cx="788565" cy="654341"/>
+            <a:ext cx="875930" cy="654341"/>
           </a:xfrm>
           <a:prstGeom prst="line">
             <a:avLst/>
@@ -6152,7 +6228,7 @@
         <p:spPr/>
         <p:txBody>
           <a:bodyPr>
-            <a:normAutofit lnSpcReduction="10000"/>
+            <a:normAutofit fontScale="92500" lnSpcReduction="10000"/>
           </a:bodyPr>
           <a:lstStyle/>
           <a:p>
@@ -6165,26 +6241,28 @@
             <a:pPr lvl="1"/>
             <a:r>
               <a:rPr lang="en-US" dirty="0"/>
-              <a:t>Device interceptors</a:t>
+              <a:t>Device handlers</a:t>
             </a:r>
           </a:p>
           <a:p>
             <a:pPr lvl="1"/>
             <a:r>
               <a:rPr lang="en-US" dirty="0"/>
-              <a:t>Set of </a:t>
-            </a:r>
-            <a:r>
-              <a:rPr lang="en-US" dirty="0" err="1"/>
-              <a:t>Tracees</a:t>
-            </a:r>
-            <a:endParaRPr lang="en-US" dirty="0"/>
+              <a:t>Set of apps</a:t>
+            </a:r>
           </a:p>
           <a:p>
             <a:pPr lvl="1"/>
             <a:r>
               <a:rPr lang="en-US" dirty="0"/>
               <a:t>X Server</a:t>
+            </a:r>
+          </a:p>
+          <a:p>
+            <a:pPr lvl="1"/>
+            <a:r>
+              <a:rPr lang="en-US" dirty="0"/>
+              <a:t>Default config</a:t>
             </a:r>
           </a:p>
           <a:p>
@@ -6218,7 +6296,7 @@
           <a:p>
             <a:r>
               <a:rPr lang="en-US" dirty="0"/>
-              <a:t>Generic device interceptors</a:t>
+              <a:t>Extensible device handler interface</a:t>
             </a:r>
           </a:p>
           <a:p>
@@ -6324,14 +6402,14 @@
             <a:pPr lvl="1"/>
             <a:r>
               <a:rPr lang="en-US" dirty="0"/>
-              <a:t>Originally the file was read and presented periodically</a:t>
+              <a:t>Originally the file was periodically read and presented</a:t>
             </a:r>
           </a:p>
           <a:p>
             <a:pPr lvl="1"/>
             <a:r>
               <a:rPr lang="en-US" dirty="0"/>
-              <a:t>Now sending it on a localhost socket</a:t>
+              <a:t>Now sending memory content on a localhost socket</a:t>
             </a:r>
           </a:p>
           <a:p>
@@ -6373,9 +6451,10 @@
               <a:t>snd</a:t>
             </a:r>
             <a:r>
-              <a:rPr lang="en-US" dirty="0"/>
-              <a:t>/pcmC0D0</a:t>
-            </a:r>
+              <a:rPr lang="en-US"/>
+              <a:t>/pcmC0D0p</a:t>
+            </a:r>
+            <a:endParaRPr lang="en-US" dirty="0"/>
           </a:p>
           <a:p>
             <a:pPr lvl="1"/>
@@ -6394,7 +6473,6 @@
               <a:rPr lang="en-US" dirty="0"/>
               <a:t> library</a:t>
             </a:r>
-            <a:endParaRPr lang="en-US" dirty="0"/>
           </a:p>
         </p:txBody>
       </p:sp>
@@ -6516,8 +6594,8 @@
               <a:t> </a:t>
             </a:r>
             <a:r>
-              <a:rPr lang="hu-HU" dirty="0" err="1"/>
-              <a:t>to</a:t>
+              <a:rPr lang="en-US" dirty="0"/>
+              <a:t>the</a:t>
             </a:r>
             <a:r>
               <a:rPr lang="hu-HU" dirty="0"/>
@@ -6624,7 +6702,6 @@
               <a:rPr lang="en-US" dirty="0"/>
               <a:t>How emulation works?</a:t>
             </a:r>
-            <a:endParaRPr lang="en-US" dirty="0"/>
           </a:p>
         </p:txBody>
       </p:sp>
@@ -6948,7 +7025,9 @@
         </p:nvSpPr>
         <p:spPr/>
         <p:txBody>
-          <a:bodyPr/>
+          <a:bodyPr>
+            <a:normAutofit fontScale="92500" lnSpcReduction="10000"/>
+          </a:bodyPr>
           <a:lstStyle/>
           <a:p>
             <a:r>
@@ -6973,6 +7052,22 @@
           </a:p>
           <a:p>
             <a:r>
+              <a:rPr lang="en-US" dirty="0" err="1"/>
+              <a:t>Posix</a:t>
+            </a:r>
+            <a:r>
+              <a:rPr lang="en-US" dirty="0"/>
+              <a:t> v1 support</a:t>
+            </a:r>
+          </a:p>
+          <a:p>
+            <a:r>
+              <a:rPr lang="en-US" dirty="0"/>
+              <a:t>SFU</a:t>
+            </a:r>
+          </a:p>
+          <a:p>
+            <a:r>
               <a:rPr lang="en-US" dirty="0"/>
               <a:t>Project Drawbridge</a:t>
             </a:r>
@@ -7001,7 +7096,7 @@
           <a:p>
             <a:r>
               <a:rPr lang="en-US" dirty="0"/>
-              <a:t>Android Subsystem for Windows</a:t>
+              <a:t>Project Astoria - Windows Bridge for Android</a:t>
             </a:r>
           </a:p>
           <a:p>
@@ -7097,7 +7192,9 @@
         </p:nvSpPr>
         <p:spPr/>
         <p:txBody>
-          <a:bodyPr/>
+          <a:bodyPr>
+            <a:normAutofit fontScale="85000" lnSpcReduction="20000"/>
+          </a:bodyPr>
           <a:lstStyle/>
           <a:p>
             <a:r>
@@ -7153,18 +7250,35 @@
               <a:rPr lang="hu-HU" dirty="0" err="1"/>
               <a:t>exe</a:t>
             </a:r>
-            <a:endParaRPr lang="hu-HU" dirty="0"/>
+            <a:endParaRPr lang="en-US" dirty="0"/>
+          </a:p>
+          <a:p>
+            <a:r>
+              <a:rPr lang="en-US" dirty="0"/>
+              <a:t>Ubuntu 14.04 LTS </a:t>
+            </a:r>
+          </a:p>
+          <a:p>
+            <a:r>
+              <a:rPr lang="en-US" dirty="0"/>
+              <a:t>Cooperation with Canonical</a:t>
+            </a:r>
+          </a:p>
+          <a:p>
+            <a:r>
+              <a:rPr lang="en-US" dirty="0"/>
+              <a:t>Focus on console apps and developer </a:t>
+            </a:r>
+            <a:r>
+              <a:rPr lang="en-US" dirty="0" err="1"/>
+              <a:t>tools+server</a:t>
+            </a:r>
+            <a:endParaRPr lang="en-US" dirty="0"/>
           </a:p>
           <a:p>
             <a:r>
               <a:rPr lang="en-US" dirty="0"/>
               <a:t>64 bit only</a:t>
-            </a:r>
-          </a:p>
-          <a:p>
-            <a:r>
-              <a:rPr lang="en-US" dirty="0"/>
-              <a:t>Focus on console apps and developer tools</a:t>
             </a:r>
           </a:p>
           <a:p>
@@ -7210,6 +7324,12 @@
             <a:r>
               <a:rPr lang="en-US" dirty="0"/>
               <a:t> 2)</a:t>
+            </a:r>
+          </a:p>
+          <a:p>
+            <a:r>
+              <a:rPr lang="en-US" dirty="0"/>
+              <a:t>Other distributions can be hacked</a:t>
             </a:r>
           </a:p>
         </p:txBody>

</xml_diff>

<commit_message>
Update meetup presentation pptx
</commit_message>
<xml_diff>
--- a/talks/entdev170222/EntDev170222_MSLovesLinux.pptx
+++ b/talks/entdev170222/EntDev170222_MSLovesLinux.pptx
@@ -5,7 +5,7 @@
     <p:sldMasterId id="2147483648" r:id="rId1"/>
   </p:sldMasterIdLst>
   <p:notesMasterIdLst>
-    <p:notesMasterId r:id="rId23"/>
+    <p:notesMasterId r:id="rId24"/>
   </p:notesMasterIdLst>
   <p:sldIdLst>
     <p:sldId id="256" r:id="rId2"/>
@@ -24,11 +24,12 @@
     <p:sldId id="272" r:id="rId15"/>
     <p:sldId id="269" r:id="rId16"/>
     <p:sldId id="271" r:id="rId17"/>
-    <p:sldId id="270" r:id="rId18"/>
-    <p:sldId id="273" r:id="rId19"/>
-    <p:sldId id="275" r:id="rId20"/>
-    <p:sldId id="276" r:id="rId21"/>
-    <p:sldId id="274" r:id="rId22"/>
+    <p:sldId id="277" r:id="rId18"/>
+    <p:sldId id="270" r:id="rId19"/>
+    <p:sldId id="273" r:id="rId20"/>
+    <p:sldId id="275" r:id="rId21"/>
+    <p:sldId id="276" r:id="rId22"/>
+    <p:sldId id="274" r:id="rId23"/>
   </p:sldIdLst>
   <p:sldSz cx="12192000" cy="6858000"/>
   <p:notesSz cx="6858000" cy="9144000"/>
@@ -217,7 +218,7 @@
           <a:p>
             <a:fld id="{FF887124-A3AA-467C-B375-1690662688A0}" type="datetimeFigureOut">
               <a:rPr lang="en-US" smtClean="0"/>
-              <a:t>2/12/2017</a:t>
+              <a:t>2/16/2017</a:t>
             </a:fld>
             <a:endParaRPr lang="en-US"/>
           </a:p>
@@ -586,8 +587,13 @@
             </a:r>
             <a:r>
               <a:rPr lang="en-US" dirty="0"/>
-              <a:t>, mount</a:t>
-            </a:r>
+              <a:t>, mount, </a:t>
+            </a:r>
+            <a:r>
+              <a:rPr lang="en-US"/>
+              <a:t>dpkg</a:t>
+            </a:r>
+            <a:endParaRPr lang="en-US" dirty="0"/>
           </a:p>
           <a:p>
             <a:r>
@@ -947,7 +953,7 @@
           <a:p>
             <a:fld id="{20E7F039-6ACC-45DB-B329-DF29D647B5FB}" type="datetimeFigureOut">
               <a:rPr lang="en-US" smtClean="0"/>
-              <a:t>2/12/2017</a:t>
+              <a:t>2/16/2017</a:t>
             </a:fld>
             <a:endParaRPr lang="en-US"/>
           </a:p>
@@ -1115,7 +1121,7 @@
           <a:p>
             <a:fld id="{20E7F039-6ACC-45DB-B329-DF29D647B5FB}" type="datetimeFigureOut">
               <a:rPr lang="en-US" smtClean="0"/>
-              <a:t>2/12/2017</a:t>
+              <a:t>2/16/2017</a:t>
             </a:fld>
             <a:endParaRPr lang="en-US"/>
           </a:p>
@@ -1293,7 +1299,7 @@
           <a:p>
             <a:fld id="{20E7F039-6ACC-45DB-B329-DF29D647B5FB}" type="datetimeFigureOut">
               <a:rPr lang="en-US" smtClean="0"/>
-              <a:t>2/12/2017</a:t>
+              <a:t>2/16/2017</a:t>
             </a:fld>
             <a:endParaRPr lang="en-US"/>
           </a:p>
@@ -1461,7 +1467,7 @@
           <a:p>
             <a:fld id="{20E7F039-6ACC-45DB-B329-DF29D647B5FB}" type="datetimeFigureOut">
               <a:rPr lang="en-US" smtClean="0"/>
-              <a:t>2/12/2017</a:t>
+              <a:t>2/16/2017</a:t>
             </a:fld>
             <a:endParaRPr lang="en-US"/>
           </a:p>
@@ -1706,7 +1712,7 @@
           <a:p>
             <a:fld id="{20E7F039-6ACC-45DB-B329-DF29D647B5FB}" type="datetimeFigureOut">
               <a:rPr lang="en-US" smtClean="0"/>
-              <a:t>2/12/2017</a:t>
+              <a:t>2/16/2017</a:t>
             </a:fld>
             <a:endParaRPr lang="en-US"/>
           </a:p>
@@ -1935,7 +1941,7 @@
           <a:p>
             <a:fld id="{20E7F039-6ACC-45DB-B329-DF29D647B5FB}" type="datetimeFigureOut">
               <a:rPr lang="en-US" smtClean="0"/>
-              <a:t>2/12/2017</a:t>
+              <a:t>2/16/2017</a:t>
             </a:fld>
             <a:endParaRPr lang="en-US"/>
           </a:p>
@@ -2299,7 +2305,7 @@
           <a:p>
             <a:fld id="{20E7F039-6ACC-45DB-B329-DF29D647B5FB}" type="datetimeFigureOut">
               <a:rPr lang="en-US" smtClean="0"/>
-              <a:t>2/12/2017</a:t>
+              <a:t>2/16/2017</a:t>
             </a:fld>
             <a:endParaRPr lang="en-US"/>
           </a:p>
@@ -2416,7 +2422,7 @@
           <a:p>
             <a:fld id="{20E7F039-6ACC-45DB-B329-DF29D647B5FB}" type="datetimeFigureOut">
               <a:rPr lang="en-US" smtClean="0"/>
-              <a:t>2/12/2017</a:t>
+              <a:t>2/16/2017</a:t>
             </a:fld>
             <a:endParaRPr lang="en-US"/>
           </a:p>
@@ -2511,7 +2517,7 @@
           <a:p>
             <a:fld id="{20E7F039-6ACC-45DB-B329-DF29D647B5FB}" type="datetimeFigureOut">
               <a:rPr lang="en-US" smtClean="0"/>
-              <a:t>2/12/2017</a:t>
+              <a:t>2/16/2017</a:t>
             </a:fld>
             <a:endParaRPr lang="en-US"/>
           </a:p>
@@ -2786,7 +2792,7 @@
           <a:p>
             <a:fld id="{20E7F039-6ACC-45DB-B329-DF29D647B5FB}" type="datetimeFigureOut">
               <a:rPr lang="en-US" smtClean="0"/>
-              <a:t>2/12/2017</a:t>
+              <a:t>2/16/2017</a:t>
             </a:fld>
             <a:endParaRPr lang="en-US"/>
           </a:p>
@@ -3038,7 +3044,7 @@
           <a:p>
             <a:fld id="{20E7F039-6ACC-45DB-B329-DF29D647B5FB}" type="datetimeFigureOut">
               <a:rPr lang="en-US" smtClean="0"/>
-              <a:t>2/12/2017</a:t>
+              <a:t>2/16/2017</a:t>
             </a:fld>
             <a:endParaRPr lang="en-US"/>
           </a:p>
@@ -3249,7 +3255,7 @@
           <a:p>
             <a:fld id="{20E7F039-6ACC-45DB-B329-DF29D647B5FB}" type="datetimeFigureOut">
               <a:rPr lang="en-US" smtClean="0"/>
-              <a:t>2/12/2017</a:t>
+              <a:t>2/16/2017</a:t>
             </a:fld>
             <a:endParaRPr lang="en-US"/>
           </a:p>
@@ -4833,6 +4839,24 @@
             <a:pPr lvl="1"/>
             <a:r>
               <a:rPr lang="en-US" dirty="0"/>
+              <a:t>DNS</a:t>
+            </a:r>
+          </a:p>
+          <a:p>
+            <a:pPr lvl="1"/>
+            <a:r>
+              <a:rPr lang="en-US" dirty="0"/>
+              <a:t>Socket - </a:t>
+            </a:r>
+            <a:r>
+              <a:rPr lang="en-US" dirty="0"/>
+              <a:t>TCP, UDP, RAW</a:t>
+            </a:r>
+          </a:p>
+          <a:p>
+            <a:pPr lvl="1"/>
+            <a:r>
+              <a:rPr lang="en-US" dirty="0"/>
               <a:t>localhost</a:t>
             </a:r>
           </a:p>
@@ -4926,7 +4950,12 @@
             <p:ph idx="1"/>
           </p:nvPr>
         </p:nvSpPr>
-        <p:spPr/>
+        <p:spPr>
+          <a:xfrm>
+            <a:off x="838200" y="1825625"/>
+            <a:ext cx="10515600" cy="4351338"/>
+          </a:xfrm>
+        </p:spPr>
         <p:txBody>
           <a:bodyPr/>
           <a:lstStyle/>
@@ -4939,19 +4968,19 @@
           <a:p>
             <a:r>
               <a:rPr lang="en-US" dirty="0"/>
+              <a:t>No Graphics</a:t>
+            </a:r>
+          </a:p>
+          <a:p>
+            <a:r>
+              <a:rPr lang="en-US" dirty="0"/>
+              <a:t>No X</a:t>
+            </a:r>
+          </a:p>
+          <a:p>
+            <a:r>
+              <a:rPr lang="en-US" dirty="0"/>
               <a:t>No Mice</a:t>
-            </a:r>
-          </a:p>
-          <a:p>
-            <a:r>
-              <a:rPr lang="en-US" dirty="0"/>
-              <a:t>No Graphics</a:t>
-            </a:r>
-          </a:p>
-          <a:p>
-            <a:r>
-              <a:rPr lang="en-US" dirty="0"/>
-              <a:t>No X</a:t>
             </a:r>
           </a:p>
           <a:p>
@@ -5289,10 +5318,15 @@
             <p:ph idx="1"/>
           </p:nvPr>
         </p:nvSpPr>
-        <p:spPr/>
+        <p:spPr>
+          <a:xfrm>
+            <a:off x="838200" y="1492250"/>
+            <a:ext cx="10515600" cy="2727325"/>
+          </a:xfrm>
+        </p:spPr>
         <p:txBody>
           <a:bodyPr>
-            <a:normAutofit fontScale="92500" lnSpcReduction="10000"/>
+            <a:normAutofit/>
           </a:bodyPr>
           <a:lstStyle/>
           <a:p>
@@ -5346,7 +5380,15 @@
           <a:p>
             <a:r>
               <a:rPr lang="en-US" dirty="0"/>
-              <a:t>Attaches to the remote process as a debugger – </a:t>
+              <a:t>Attaches to the </a:t>
+            </a:r>
+            <a:r>
+              <a:rPr lang="en-US" dirty="0" err="1"/>
+              <a:t>UoW</a:t>
+            </a:r>
+            <a:r>
+              <a:rPr lang="en-US" dirty="0"/>
+              <a:t> Linux process as a debugger – </a:t>
             </a:r>
             <a:r>
               <a:rPr lang="en-US" dirty="0" err="1"/>
@@ -5373,52 +5415,343 @@
             </a:r>
             <a:endParaRPr lang="en-US" dirty="0"/>
           </a:p>
-          <a:p>
-            <a:r>
-              <a:rPr lang="en-US" dirty="0"/>
-              <a:t>Handle </a:t>
-            </a:r>
+        </p:txBody>
+      </p:sp>
+      <p:sp>
+        <p:nvSpPr>
+          <p:cNvPr id="4" name="Rectangle 3"/>
+          <p:cNvSpPr/>
+          <p:nvPr/>
+        </p:nvSpPr>
+        <p:spPr>
+          <a:xfrm>
+            <a:off x="1247775" y="4219575"/>
+            <a:ext cx="2981325" cy="2133600"/>
+          </a:xfrm>
+          <a:prstGeom prst="rect">
+            <a:avLst/>
+          </a:prstGeom>
+        </p:spPr>
+        <p:style>
+          <a:lnRef idx="2">
+            <a:schemeClr val="accent1">
+              <a:shade val="50000"/>
+            </a:schemeClr>
+          </a:lnRef>
+          <a:fillRef idx="1">
+            <a:schemeClr val="accent1"/>
+          </a:fillRef>
+          <a:effectRef idx="0">
+            <a:schemeClr val="accent1"/>
+          </a:effectRef>
+          <a:fontRef idx="minor">
+            <a:schemeClr val="lt1"/>
+          </a:fontRef>
+        </p:style>
+        <p:txBody>
+          <a:bodyPr rtlCol="0" anchor="ctr"/>
+          <a:lstStyle/>
+          <a:p>
+            <a:pPr algn="ctr"/>
             <a:r>
               <a:rPr lang="en-US" dirty="0" err="1"/>
-              <a:t>syscalls</a:t>
-            </a:r>
-            <a:r>
-              <a:rPr lang="en-US" dirty="0"/>
-              <a:t> for the above device files via </a:t>
-            </a:r>
-            <a:r>
-              <a:rPr lang="en-US" dirty="0" err="1"/>
-              <a:t>ptrace</a:t>
+              <a:t>Debuggee</a:t>
             </a:r>
             <a:endParaRPr lang="en-US" dirty="0"/>
           </a:p>
-          <a:p>
-            <a:pPr lvl="1"/>
-            <a:r>
-              <a:rPr lang="en-US" dirty="0"/>
-              <a:t>open</a:t>
-            </a:r>
-          </a:p>
-          <a:p>
-            <a:pPr lvl="1"/>
-            <a:r>
-              <a:rPr lang="en-US" dirty="0" err="1"/>
-              <a:t>ioctl</a:t>
-            </a:r>
-            <a:r>
-              <a:rPr lang="en-US" dirty="0"/>
-              <a:t>, read, write, </a:t>
-            </a:r>
-            <a:r>
-              <a:rPr lang="en-US" dirty="0" err="1"/>
-              <a:t>mmap</a:t>
-            </a:r>
-            <a:endParaRPr lang="en-US" dirty="0"/>
-          </a:p>
-          <a:p>
-            <a:r>
-              <a:rPr lang="en-US" dirty="0"/>
-              <a:t>Forwards operations, data to a WPF process via network sockets, process responses</a:t>
+        </p:txBody>
+      </p:sp>
+      <p:sp>
+        <p:nvSpPr>
+          <p:cNvPr id="5" name="Rectangle 4"/>
+          <p:cNvSpPr/>
+          <p:nvPr/>
+        </p:nvSpPr>
+        <p:spPr>
+          <a:xfrm>
+            <a:off x="6419850" y="4219575"/>
+            <a:ext cx="2505076" cy="2133599"/>
+          </a:xfrm>
+          <a:prstGeom prst="rect">
+            <a:avLst/>
+          </a:prstGeom>
+        </p:spPr>
+        <p:style>
+          <a:lnRef idx="2">
+            <a:schemeClr val="accent2">
+              <a:shade val="50000"/>
+            </a:schemeClr>
+          </a:lnRef>
+          <a:fillRef idx="1">
+            <a:schemeClr val="accent2"/>
+          </a:fillRef>
+          <a:effectRef idx="0">
+            <a:schemeClr val="accent2"/>
+          </a:effectRef>
+          <a:fontRef idx="minor">
+            <a:schemeClr val="lt1"/>
+          </a:fontRef>
+        </p:style>
+        <p:txBody>
+          <a:bodyPr rtlCol="0" anchor="ctr"/>
+          <a:lstStyle/>
+          <a:p>
+            <a:pPr algn="ctr"/>
+            <a:r>
+              <a:rPr lang="en-US" dirty="0"/>
+              <a:t>Debugger</a:t>
+            </a:r>
+          </a:p>
+        </p:txBody>
+      </p:sp>
+      <p:cxnSp>
+        <p:nvCxnSpPr>
+          <p:cNvPr id="7" name="Straight Arrow Connector 6"/>
+          <p:cNvCxnSpPr/>
+          <p:nvPr/>
+        </p:nvCxnSpPr>
+        <p:spPr>
+          <a:xfrm flipH="1">
+            <a:off x="4229100" y="4391025"/>
+            <a:ext cx="2190750" cy="0"/>
+          </a:xfrm>
+          <a:prstGeom prst="straightConnector1">
+            <a:avLst/>
+          </a:prstGeom>
+          <a:ln>
+            <a:tailEnd type="triangle"/>
+          </a:ln>
+        </p:spPr>
+        <p:style>
+          <a:lnRef idx="1">
+            <a:schemeClr val="accent1"/>
+          </a:lnRef>
+          <a:fillRef idx="0">
+            <a:schemeClr val="accent1"/>
+          </a:fillRef>
+          <a:effectRef idx="0">
+            <a:schemeClr val="accent1"/>
+          </a:effectRef>
+          <a:fontRef idx="minor">
+            <a:schemeClr val="tx1"/>
+          </a:fontRef>
+        </p:style>
+      </p:cxnSp>
+      <p:cxnSp>
+        <p:nvCxnSpPr>
+          <p:cNvPr id="9" name="Straight Arrow Connector 8"/>
+          <p:cNvCxnSpPr/>
+          <p:nvPr/>
+        </p:nvCxnSpPr>
+        <p:spPr>
+          <a:xfrm>
+            <a:off x="4229100" y="4819650"/>
+            <a:ext cx="2190750" cy="9525"/>
+          </a:xfrm>
+          <a:prstGeom prst="straightConnector1">
+            <a:avLst/>
+          </a:prstGeom>
+          <a:ln>
+            <a:tailEnd type="triangle"/>
+          </a:ln>
+        </p:spPr>
+        <p:style>
+          <a:lnRef idx="1">
+            <a:schemeClr val="accent1"/>
+          </a:lnRef>
+          <a:fillRef idx="0">
+            <a:schemeClr val="accent1"/>
+          </a:fillRef>
+          <a:effectRef idx="0">
+            <a:schemeClr val="accent1"/>
+          </a:effectRef>
+          <a:fontRef idx="minor">
+            <a:schemeClr val="tx1"/>
+          </a:fontRef>
+        </p:style>
+      </p:cxnSp>
+      <p:cxnSp>
+        <p:nvCxnSpPr>
+          <p:cNvPr id="10" name="Straight Arrow Connector 9"/>
+          <p:cNvCxnSpPr/>
+          <p:nvPr/>
+        </p:nvCxnSpPr>
+        <p:spPr>
+          <a:xfrm>
+            <a:off x="4229100" y="4962525"/>
+            <a:ext cx="2190750" cy="9525"/>
+          </a:xfrm>
+          <a:prstGeom prst="straightConnector1">
+            <a:avLst/>
+          </a:prstGeom>
+          <a:ln>
+            <a:tailEnd type="triangle"/>
+          </a:ln>
+        </p:spPr>
+        <p:style>
+          <a:lnRef idx="1">
+            <a:schemeClr val="accent1"/>
+          </a:lnRef>
+          <a:fillRef idx="0">
+            <a:schemeClr val="accent1"/>
+          </a:fillRef>
+          <a:effectRef idx="0">
+            <a:schemeClr val="accent1"/>
+          </a:effectRef>
+          <a:fontRef idx="minor">
+            <a:schemeClr val="tx1"/>
+          </a:fontRef>
+        </p:style>
+      </p:cxnSp>
+      <p:cxnSp>
+        <p:nvCxnSpPr>
+          <p:cNvPr id="11" name="Straight Arrow Connector 10"/>
+          <p:cNvCxnSpPr/>
+          <p:nvPr/>
+        </p:nvCxnSpPr>
+        <p:spPr>
+          <a:xfrm>
+            <a:off x="4229100" y="5105400"/>
+            <a:ext cx="2190750" cy="9525"/>
+          </a:xfrm>
+          <a:prstGeom prst="straightConnector1">
+            <a:avLst/>
+          </a:prstGeom>
+          <a:ln>
+            <a:tailEnd type="triangle"/>
+          </a:ln>
+        </p:spPr>
+        <p:style>
+          <a:lnRef idx="1">
+            <a:schemeClr val="accent1"/>
+          </a:lnRef>
+          <a:fillRef idx="0">
+            <a:schemeClr val="accent1"/>
+          </a:fillRef>
+          <a:effectRef idx="0">
+            <a:schemeClr val="accent1"/>
+          </a:effectRef>
+          <a:fontRef idx="minor">
+            <a:schemeClr val="tx1"/>
+          </a:fontRef>
+        </p:style>
+      </p:cxnSp>
+      <p:cxnSp>
+        <p:nvCxnSpPr>
+          <p:cNvPr id="12" name="Straight Arrow Connector 11"/>
+          <p:cNvCxnSpPr/>
+          <p:nvPr/>
+        </p:nvCxnSpPr>
+        <p:spPr>
+          <a:xfrm flipH="1">
+            <a:off x="4229100" y="5800725"/>
+            <a:ext cx="2190750" cy="0"/>
+          </a:xfrm>
+          <a:prstGeom prst="straightConnector1">
+            <a:avLst/>
+          </a:prstGeom>
+          <a:ln>
+            <a:tailEnd type="triangle"/>
+          </a:ln>
+        </p:spPr>
+        <p:style>
+          <a:lnRef idx="1">
+            <a:schemeClr val="accent1"/>
+          </a:lnRef>
+          <a:fillRef idx="0">
+            <a:schemeClr val="accent1"/>
+          </a:fillRef>
+          <a:effectRef idx="0">
+            <a:schemeClr val="accent1"/>
+          </a:effectRef>
+          <a:fontRef idx="minor">
+            <a:schemeClr val="tx1"/>
+          </a:fontRef>
+        </p:style>
+      </p:cxnSp>
+      <p:sp>
+        <p:nvSpPr>
+          <p:cNvPr id="14" name="TextBox 13"/>
+          <p:cNvSpPr txBox="1"/>
+          <p:nvPr/>
+        </p:nvSpPr>
+        <p:spPr>
+          <a:xfrm>
+            <a:off x="4905375" y="4276725"/>
+            <a:ext cx="771173" cy="369332"/>
+          </a:xfrm>
+          <a:prstGeom prst="rect">
+            <a:avLst/>
+          </a:prstGeom>
+          <a:noFill/>
+        </p:spPr>
+        <p:txBody>
+          <a:bodyPr wrap="none" rtlCol="0">
+            <a:spAutoFit/>
+          </a:bodyPr>
+          <a:lstStyle/>
+          <a:p>
+            <a:r>
+              <a:rPr lang="en-US" dirty="0"/>
+              <a:t>attach</a:t>
+            </a:r>
+          </a:p>
+        </p:txBody>
+      </p:sp>
+      <p:sp>
+        <p:nvSpPr>
+          <p:cNvPr id="15" name="TextBox 14"/>
+          <p:cNvSpPr txBox="1"/>
+          <p:nvPr/>
+        </p:nvSpPr>
+        <p:spPr>
+          <a:xfrm>
+            <a:off x="4629150" y="5019675"/>
+            <a:ext cx="1410258" cy="369332"/>
+          </a:xfrm>
+          <a:prstGeom prst="rect">
+            <a:avLst/>
+          </a:prstGeom>
+          <a:noFill/>
+        </p:spPr>
+        <p:txBody>
+          <a:bodyPr wrap="none" rtlCol="0">
+            <a:spAutoFit/>
+          </a:bodyPr>
+          <a:lstStyle/>
+          <a:p>
+            <a:r>
+              <a:rPr lang="en-US" dirty="0"/>
+              <a:t>handle event</a:t>
+            </a:r>
+          </a:p>
+        </p:txBody>
+      </p:sp>
+      <p:sp>
+        <p:nvSpPr>
+          <p:cNvPr id="16" name="TextBox 15"/>
+          <p:cNvSpPr txBox="1"/>
+          <p:nvPr/>
+        </p:nvSpPr>
+        <p:spPr>
+          <a:xfrm>
+            <a:off x="4876800" y="5715000"/>
+            <a:ext cx="850169" cy="369332"/>
+          </a:xfrm>
+          <a:prstGeom prst="rect">
+            <a:avLst/>
+          </a:prstGeom>
+          <a:noFill/>
+        </p:spPr>
+        <p:txBody>
+          <a:bodyPr wrap="none" rtlCol="0">
+            <a:spAutoFit/>
+          </a:bodyPr>
+          <a:lstStyle/>
+          <a:p>
+            <a:r>
+              <a:rPr lang="en-US" dirty="0"/>
+              <a:t>control</a:t>
             </a:r>
           </a:p>
         </p:txBody>
@@ -5437,6 +5770,160 @@
 </file>
 
 <file path=ppt/slides/slide17.xml><?xml version="1.0" encoding="utf-8"?>
+<p:sld xmlns:a="http://schemas.openxmlformats.org/drawingml/2006/main" xmlns:r="http://schemas.openxmlformats.org/officeDocument/2006/relationships" xmlns:p="http://schemas.openxmlformats.org/presentationml/2006/main">
+  <p:cSld>
+    <p:spTree>
+      <p:nvGrpSpPr>
+        <p:cNvPr id="1" name=""/>
+        <p:cNvGrpSpPr/>
+        <p:nvPr/>
+      </p:nvGrpSpPr>
+      <p:grpSpPr>
+        <a:xfrm>
+          <a:off x="0" y="0"/>
+          <a:ext cx="0" cy="0"/>
+          <a:chOff x="0" y="0"/>
+          <a:chExt cx="0" cy="0"/>
+        </a:xfrm>
+      </p:grpSpPr>
+      <p:sp>
+        <p:nvSpPr>
+          <p:cNvPr id="2" name="Title 1"/>
+          <p:cNvSpPr>
+            <a:spLocks noGrp="1"/>
+          </p:cNvSpPr>
+          <p:nvPr>
+            <p:ph type="title"/>
+          </p:nvPr>
+        </p:nvSpPr>
+        <p:spPr/>
+        <p:txBody>
+          <a:bodyPr/>
+          <a:lstStyle/>
+          <a:p>
+            <a:r>
+              <a:rPr lang="en-US" dirty="0"/>
+              <a:t>How </a:t>
+            </a:r>
+            <a:r>
+              <a:rPr lang="en-US" dirty="0" err="1"/>
+              <a:t>LoWe</a:t>
+            </a:r>
+            <a:r>
+              <a:rPr lang="en-US" dirty="0"/>
+              <a:t> works?</a:t>
+            </a:r>
+          </a:p>
+        </p:txBody>
+      </p:sp>
+      <p:sp>
+        <p:nvSpPr>
+          <p:cNvPr id="3" name="Content Placeholder 2"/>
+          <p:cNvSpPr>
+            <a:spLocks noGrp="1"/>
+          </p:cNvSpPr>
+          <p:nvPr>
+            <p:ph idx="1"/>
+          </p:nvPr>
+        </p:nvSpPr>
+        <p:spPr/>
+        <p:txBody>
+          <a:bodyPr>
+            <a:normAutofit/>
+          </a:bodyPr>
+          <a:lstStyle/>
+          <a:p>
+            <a:r>
+              <a:rPr lang="en-US" dirty="0"/>
+              <a:t>The Debugger app is called </a:t>
+            </a:r>
+            <a:r>
+              <a:rPr lang="en-US" dirty="0" err="1"/>
+              <a:t>LoweAgent</a:t>
+            </a:r>
+            <a:endParaRPr lang="en-US" dirty="0"/>
+          </a:p>
+          <a:p>
+            <a:r>
+              <a:rPr lang="en-US" dirty="0"/>
+              <a:t>Handle </a:t>
+            </a:r>
+            <a:r>
+              <a:rPr lang="en-US" dirty="0" err="1"/>
+              <a:t>syscalls</a:t>
+            </a:r>
+            <a:r>
+              <a:rPr lang="en-US" dirty="0"/>
+              <a:t> for the mentioned device files via </a:t>
+            </a:r>
+            <a:r>
+              <a:rPr lang="en-US" dirty="0" err="1"/>
+              <a:t>ptrace</a:t>
+            </a:r>
+            <a:endParaRPr lang="en-US" dirty="0"/>
+          </a:p>
+          <a:p>
+            <a:pPr lvl="1"/>
+            <a:r>
+              <a:rPr lang="en-US" dirty="0"/>
+              <a:t>open</a:t>
+            </a:r>
+          </a:p>
+          <a:p>
+            <a:pPr lvl="1"/>
+            <a:r>
+              <a:rPr lang="en-US" dirty="0" err="1"/>
+              <a:t>ioctl</a:t>
+            </a:r>
+            <a:r>
+              <a:rPr lang="en-US" dirty="0"/>
+              <a:t>, read, write, </a:t>
+            </a:r>
+            <a:r>
+              <a:rPr lang="en-US" dirty="0" err="1"/>
+              <a:t>mmap</a:t>
+            </a:r>
+            <a:endParaRPr lang="en-US" dirty="0"/>
+          </a:p>
+          <a:p>
+            <a:r>
+              <a:rPr lang="en-US" dirty="0"/>
+              <a:t>Forwards operations, data to a WPF app via network sockets, process responses</a:t>
+            </a:r>
+          </a:p>
+          <a:p>
+            <a:r>
+              <a:rPr lang="en-US" dirty="0"/>
+              <a:t>WPF app is displaying graphics, providing sound, handling mouse and keyboard</a:t>
+            </a:r>
+          </a:p>
+          <a:p>
+            <a:r>
+              <a:rPr lang="en-US" dirty="0"/>
+              <a:t>WPF app is called </a:t>
+            </a:r>
+            <a:r>
+              <a:rPr lang="en-US" dirty="0" err="1"/>
+              <a:t>LoweExposer</a:t>
+            </a:r>
+            <a:endParaRPr lang="en-US" dirty="0"/>
+          </a:p>
+        </p:txBody>
+      </p:sp>
+    </p:spTree>
+    <p:extLst>
+      <p:ext uri="{BB962C8B-B14F-4D97-AF65-F5344CB8AC3E}">
+        <p14:creationId xmlns:p14="http://schemas.microsoft.com/office/powerpoint/2010/main" val="2542901151"/>
+      </p:ext>
+    </p:extLst>
+  </p:cSld>
+  <p:clrMapOvr>
+    <a:masterClrMapping/>
+  </p:clrMapOvr>
+</p:sld>
+</file>
+
+<file path=ppt/slides/slide18.xml><?xml version="1.0" encoding="utf-8"?>
 <p:sld xmlns:a="http://schemas.openxmlformats.org/drawingml/2006/main" xmlns:r="http://schemas.openxmlformats.org/officeDocument/2006/relationships" xmlns:p="http://schemas.openxmlformats.org/presentationml/2006/main">
   <p:cSld>
     <p:spTree>
@@ -5561,7 +6048,7 @@
         </p:nvSpPr>
         <p:spPr>
           <a:xfrm>
-            <a:off x="1191237" y="2961313"/>
+            <a:off x="1355998" y="3423962"/>
             <a:ext cx="1098957" cy="1065402"/>
           </a:xfrm>
           <a:prstGeom prst="rect">
@@ -5604,7 +6091,7 @@
         </p:nvSpPr>
         <p:spPr>
           <a:xfrm>
-            <a:off x="2072081" y="4681056"/>
+            <a:off x="1301787" y="5134737"/>
             <a:ext cx="1089130" cy="914400"/>
           </a:xfrm>
           <a:prstGeom prst="rect">
@@ -5694,8 +6181,8 @@
         </p:nvCxnSpPr>
         <p:spPr>
           <a:xfrm flipH="1">
-            <a:off x="2290194" y="3120704"/>
-            <a:ext cx="1305188" cy="373310"/>
+            <a:off x="2454955" y="3120704"/>
+            <a:ext cx="1140427" cy="835959"/>
           </a:xfrm>
           <a:prstGeom prst="line">
             <a:avLst/>
@@ -5728,7 +6215,7 @@
         </p:nvCxnSpPr>
         <p:spPr>
           <a:xfrm flipH="1">
-            <a:off x="1740715" y="4026715"/>
+            <a:off x="1905476" y="4489364"/>
             <a:ext cx="1" cy="0"/>
           </a:xfrm>
           <a:prstGeom prst="line">
@@ -5761,9 +6248,9 @@
           <p:nvPr/>
         </p:nvCxnSpPr>
         <p:spPr>
-          <a:xfrm flipH="1" flipV="1">
-            <a:off x="1740716" y="4026715"/>
-            <a:ext cx="875930" cy="654341"/>
+          <a:xfrm flipV="1">
+            <a:off x="1846352" y="4489364"/>
+            <a:ext cx="59125" cy="645373"/>
           </a:xfrm>
           <a:prstGeom prst="line">
             <a:avLst/>
@@ -5907,7 +6394,7 @@
         </p:nvSpPr>
         <p:spPr>
           <a:xfrm>
-            <a:off x="2454955" y="2956794"/>
+            <a:off x="2588682" y="3465369"/>
             <a:ext cx="781624" cy="369332"/>
           </a:xfrm>
           <a:prstGeom prst="rect">
@@ -6159,170 +6646,146 @@
           </a:p>
         </p:txBody>
       </p:sp>
+      <p:sp>
+        <p:nvSpPr>
+          <p:cNvPr id="24" name="Rectangle 23"/>
+          <p:cNvSpPr/>
+          <p:nvPr/>
+        </p:nvSpPr>
+        <p:spPr>
+          <a:xfrm>
+            <a:off x="1326435" y="2145979"/>
+            <a:ext cx="1098957" cy="1065402"/>
+          </a:xfrm>
+          <a:prstGeom prst="rect">
+            <a:avLst/>
+          </a:prstGeom>
+        </p:spPr>
+        <p:style>
+          <a:lnRef idx="2">
+            <a:schemeClr val="accent2">
+              <a:shade val="50000"/>
+            </a:schemeClr>
+          </a:lnRef>
+          <a:fillRef idx="1">
+            <a:schemeClr val="accent2"/>
+          </a:fillRef>
+          <a:effectRef idx="0">
+            <a:schemeClr val="accent2"/>
+          </a:effectRef>
+          <a:fontRef idx="minor">
+            <a:schemeClr val="lt1"/>
+          </a:fontRef>
+        </p:style>
+        <p:txBody>
+          <a:bodyPr rtlCol="0" anchor="ctr"/>
+          <a:lstStyle/>
+          <a:p>
+            <a:pPr algn="ctr"/>
+            <a:r>
+              <a:rPr lang="en-US" dirty="0"/>
+              <a:t>app</a:t>
+            </a:r>
+          </a:p>
+        </p:txBody>
+      </p:sp>
+      <p:cxnSp>
+        <p:nvCxnSpPr>
+          <p:cNvPr id="32" name="Straight Connector 31"/>
+          <p:cNvCxnSpPr>
+            <a:cxnSpLocks/>
+            <a:stCxn id="12" idx="1"/>
+          </p:cNvCxnSpPr>
+          <p:nvPr/>
+        </p:nvCxnSpPr>
+        <p:spPr>
+          <a:xfrm flipH="1" flipV="1">
+            <a:off x="2439373" y="2678680"/>
+            <a:ext cx="1156009" cy="442024"/>
+          </a:xfrm>
+          <a:prstGeom prst="line">
+            <a:avLst/>
+          </a:prstGeom>
+          <a:ln w="28575"/>
+        </p:spPr>
+        <p:style>
+          <a:lnRef idx="1">
+            <a:schemeClr val="accent6"/>
+          </a:lnRef>
+          <a:fillRef idx="0">
+            <a:schemeClr val="accent6"/>
+          </a:fillRef>
+          <a:effectRef idx="0">
+            <a:schemeClr val="accent6"/>
+          </a:effectRef>
+          <a:fontRef idx="minor">
+            <a:schemeClr val="tx1"/>
+          </a:fontRef>
+        </p:style>
+      </p:cxnSp>
+      <p:sp>
+        <p:nvSpPr>
+          <p:cNvPr id="35" name="TextBox 34"/>
+          <p:cNvSpPr txBox="1"/>
+          <p:nvPr/>
+        </p:nvSpPr>
+        <p:spPr>
+          <a:xfrm>
+            <a:off x="2683932" y="2617644"/>
+            <a:ext cx="781624" cy="369332"/>
+          </a:xfrm>
+          <a:prstGeom prst="rect">
+            <a:avLst/>
+          </a:prstGeom>
+          <a:noFill/>
+        </p:spPr>
+        <p:txBody>
+          <a:bodyPr wrap="none" rtlCol="0">
+            <a:spAutoFit/>
+          </a:bodyPr>
+          <a:lstStyle/>
+          <a:p>
+            <a:r>
+              <a:rPr lang="en-US" dirty="0" err="1"/>
+              <a:t>ptrace</a:t>
+            </a:r>
+            <a:endParaRPr lang="en-US" dirty="0"/>
+          </a:p>
+        </p:txBody>
+      </p:sp>
+      <p:sp>
+        <p:nvSpPr>
+          <p:cNvPr id="36" name="TextBox 35"/>
+          <p:cNvSpPr txBox="1"/>
+          <p:nvPr/>
+        </p:nvSpPr>
+        <p:spPr>
+          <a:xfrm>
+            <a:off x="2502332" y="3066425"/>
+            <a:ext cx="343364" cy="369332"/>
+          </a:xfrm>
+          <a:prstGeom prst="rect">
+            <a:avLst/>
+          </a:prstGeom>
+          <a:noFill/>
+        </p:spPr>
+        <p:txBody>
+          <a:bodyPr wrap="none" rtlCol="0">
+            <a:spAutoFit/>
+          </a:bodyPr>
+          <a:lstStyle/>
+          <a:p>
+            <a:r>
+              <a:rPr lang="en-US" dirty="0"/>
+              <a:t>…</a:t>
+            </a:r>
+          </a:p>
+        </p:txBody>
+      </p:sp>
     </p:spTree>
     <p:extLst>
       <p:ext uri="{BB962C8B-B14F-4D97-AF65-F5344CB8AC3E}">
         <p14:creationId xmlns:p14="http://schemas.microsoft.com/office/powerpoint/2010/main" val="541253134"/>
-      </p:ext>
-    </p:extLst>
-  </p:cSld>
-  <p:clrMapOvr>
-    <a:masterClrMapping/>
-  </p:clrMapOvr>
-</p:sld>
-</file>
-
-<file path=ppt/slides/slide18.xml><?xml version="1.0" encoding="utf-8"?>
-<p:sld xmlns:a="http://schemas.openxmlformats.org/drawingml/2006/main" xmlns:r="http://schemas.openxmlformats.org/officeDocument/2006/relationships" xmlns:p="http://schemas.openxmlformats.org/presentationml/2006/main">
-  <p:cSld>
-    <p:spTree>
-      <p:nvGrpSpPr>
-        <p:cNvPr id="1" name=""/>
-        <p:cNvGrpSpPr/>
-        <p:nvPr/>
-      </p:nvGrpSpPr>
-      <p:grpSpPr>
-        <a:xfrm>
-          <a:off x="0" y="0"/>
-          <a:ext cx="0" cy="0"/>
-          <a:chOff x="0" y="0"/>
-          <a:chExt cx="0" cy="0"/>
-        </a:xfrm>
-      </p:grpSpPr>
-      <p:sp>
-        <p:nvSpPr>
-          <p:cNvPr id="2" name="Title 1"/>
-          <p:cNvSpPr>
-            <a:spLocks noGrp="1"/>
-          </p:cNvSpPr>
-          <p:nvPr>
-            <p:ph type="title"/>
-          </p:nvPr>
-        </p:nvSpPr>
-        <p:spPr/>
-        <p:txBody>
-          <a:bodyPr/>
-          <a:lstStyle/>
-          <a:p>
-            <a:r>
-              <a:rPr lang="en-US" dirty="0" err="1"/>
-              <a:t>LoWe</a:t>
-            </a:r>
-            <a:r>
-              <a:rPr lang="en-US" dirty="0"/>
-              <a:t> – features, properties</a:t>
-            </a:r>
-          </a:p>
-        </p:txBody>
-      </p:sp>
-      <p:sp>
-        <p:nvSpPr>
-          <p:cNvPr id="3" name="Content Placeholder 2"/>
-          <p:cNvSpPr>
-            <a:spLocks noGrp="1"/>
-          </p:cNvSpPr>
-          <p:nvPr>
-            <p:ph idx="1"/>
-          </p:nvPr>
-        </p:nvSpPr>
-        <p:spPr/>
-        <p:txBody>
-          <a:bodyPr>
-            <a:normAutofit fontScale="92500" lnSpcReduction="10000"/>
-          </a:bodyPr>
-          <a:lstStyle/>
-          <a:p>
-            <a:r>
-              <a:rPr lang="en-US" dirty="0"/>
-              <a:t>Requires configuration</a:t>
-            </a:r>
-          </a:p>
-          <a:p>
-            <a:pPr lvl="1"/>
-            <a:r>
-              <a:rPr lang="en-US" dirty="0"/>
-              <a:t>Device handlers</a:t>
-            </a:r>
-          </a:p>
-          <a:p>
-            <a:pPr lvl="1"/>
-            <a:r>
-              <a:rPr lang="en-US" dirty="0"/>
-              <a:t>Set of apps</a:t>
-            </a:r>
-          </a:p>
-          <a:p>
-            <a:pPr lvl="1"/>
-            <a:r>
-              <a:rPr lang="en-US" dirty="0"/>
-              <a:t>X Server</a:t>
-            </a:r>
-          </a:p>
-          <a:p>
-            <a:pPr lvl="1"/>
-            <a:r>
-              <a:rPr lang="en-US" dirty="0"/>
-              <a:t>Default config</a:t>
-            </a:r>
-          </a:p>
-          <a:p>
-            <a:r>
-              <a:rPr lang="en-US" dirty="0"/>
-              <a:t>Code</a:t>
-            </a:r>
-          </a:p>
-          <a:p>
-            <a:pPr lvl="1"/>
-            <a:r>
-              <a:rPr lang="en-US" dirty="0" err="1"/>
-              <a:t>LoWeAgent</a:t>
-            </a:r>
-            <a:r>
-              <a:rPr lang="en-US" dirty="0"/>
-              <a:t>: C++</a:t>
-            </a:r>
-          </a:p>
-          <a:p>
-            <a:pPr lvl="1"/>
-            <a:r>
-              <a:rPr lang="en-US" dirty="0" err="1"/>
-              <a:t>LoWeExposer</a:t>
-            </a:r>
-            <a:r>
-              <a:rPr lang="en-US" dirty="0"/>
-              <a:t>: C#/WPF</a:t>
-            </a:r>
-          </a:p>
-          <a:p>
-            <a:r>
-              <a:rPr lang="en-US" dirty="0"/>
-              <a:t>Extensible device handler interface</a:t>
-            </a:r>
-          </a:p>
-          <a:p>
-            <a:r>
-              <a:rPr lang="en-US" dirty="0"/>
-              <a:t>Room for performance improvement</a:t>
-            </a:r>
-          </a:p>
-          <a:p>
-            <a:r>
-              <a:rPr lang="en-US" dirty="0"/>
-              <a:t>Configurable logger</a:t>
-            </a:r>
-          </a:p>
-          <a:p>
-            <a:endParaRPr lang="en-US" dirty="0"/>
-          </a:p>
-          <a:p>
-            <a:endParaRPr lang="en-US" dirty="0"/>
-          </a:p>
-        </p:txBody>
-      </p:sp>
-    </p:spTree>
-    <p:extLst>
-      <p:ext uri="{BB962C8B-B14F-4D97-AF65-F5344CB8AC3E}">
-        <p14:creationId xmlns:p14="http://schemas.microsoft.com/office/powerpoint/2010/main" val="1799825062"/>
       </p:ext>
     </p:extLst>
   </p:cSld>
@@ -6365,8 +6828,12 @@
           <a:lstStyle/>
           <a:p>
             <a:r>
-              <a:rPr lang="en-US" dirty="0"/>
-              <a:t>How emulation works?</a:t>
+              <a:rPr lang="en-US" dirty="0" err="1"/>
+              <a:t>LoWe</a:t>
+            </a:r>
+            <a:r>
+              <a:rPr lang="en-US" dirty="0"/>
+              <a:t> – features, properties</a:t>
             </a:r>
           </a:p>
         </p:txBody>
@@ -6383,103 +6850,102 @@
         </p:nvSpPr>
         <p:spPr/>
         <p:txBody>
-          <a:bodyPr/>
-          <a:lstStyle/>
-          <a:p>
-            <a:r>
-              <a:rPr lang="en-US" dirty="0"/>
-              <a:t>Graphical framebuffer</a:t>
+          <a:bodyPr>
+            <a:normAutofit fontScale="92500" lnSpcReduction="10000"/>
+          </a:bodyPr>
+          <a:lstStyle/>
+          <a:p>
+            <a:r>
+              <a:rPr lang="en-US" dirty="0"/>
+              <a:t>Requires configuration</a:t>
             </a:r>
           </a:p>
           <a:p>
             <a:pPr lvl="1"/>
             <a:r>
               <a:rPr lang="en-US" dirty="0"/>
-              <a:t>/dev/fb0</a:t>
+              <a:t>Device handlers</a:t>
             </a:r>
           </a:p>
           <a:p>
             <a:pPr lvl="1"/>
             <a:r>
               <a:rPr lang="en-US" dirty="0"/>
-              <a:t>Originally the file was periodically read and presented</a:t>
+              <a:t>Set of apps</a:t>
             </a:r>
           </a:p>
           <a:p>
             <a:pPr lvl="1"/>
             <a:r>
               <a:rPr lang="en-US" dirty="0"/>
-              <a:t>Now sending memory content on a localhost socket</a:t>
-            </a:r>
-          </a:p>
-          <a:p>
-            <a:r>
-              <a:rPr lang="en-US" dirty="0"/>
-              <a:t>Sound</a:t>
+              <a:t>X Server</a:t>
             </a:r>
           </a:p>
           <a:p>
             <a:pPr lvl="1"/>
             <a:r>
               <a:rPr lang="en-US" dirty="0"/>
-              <a:t>ALSA calls</a:t>
+              <a:t>Default config</a:t>
+            </a:r>
+          </a:p>
+          <a:p>
+            <a:r>
+              <a:rPr lang="en-US" dirty="0"/>
+              <a:t>Code</a:t>
             </a:r>
           </a:p>
           <a:p>
             <a:pPr lvl="1"/>
             <a:r>
-              <a:rPr lang="en-US" dirty="0"/>
-              <a:t>PCM</a:t>
+              <a:rPr lang="en-US" dirty="0" err="1"/>
+              <a:t>LoWeAgent</a:t>
+            </a:r>
+            <a:r>
+              <a:rPr lang="en-US" dirty="0"/>
+              <a:t>: C++</a:t>
             </a:r>
           </a:p>
           <a:p>
             <a:pPr lvl="1"/>
             <a:r>
-              <a:rPr lang="en-US" dirty="0"/>
-              <a:t>/dev/</a:t>
-            </a:r>
-            <a:r>
               <a:rPr lang="en-US" dirty="0" err="1"/>
-              <a:t>snd</a:t>
-            </a:r>
-            <a:r>
-              <a:rPr lang="en-US" dirty="0"/>
-              <a:t>/controlC0, /dev/</a:t>
-            </a:r>
-            <a:r>
-              <a:rPr lang="en-US" dirty="0" err="1"/>
-              <a:t>snd</a:t>
-            </a:r>
-            <a:r>
-              <a:rPr lang="en-US"/>
-              <a:t>/pcmC0D0p</a:t>
-            </a:r>
+              <a:t>LoWeExposer</a:t>
+            </a:r>
+            <a:r>
+              <a:rPr lang="en-US" dirty="0"/>
+              <a:t>: C#/WPF</a:t>
+            </a:r>
+          </a:p>
+          <a:p>
+            <a:r>
+              <a:rPr lang="en-US" dirty="0"/>
+              <a:t>Extensible device handler interface</a:t>
+            </a:r>
+          </a:p>
+          <a:p>
+            <a:r>
+              <a:rPr lang="en-US" dirty="0"/>
+              <a:t>Room for performance improvement</a:t>
+            </a:r>
+          </a:p>
+          <a:p>
+            <a:r>
+              <a:rPr lang="en-US" dirty="0"/>
+              <a:t>Configurable logger</a:t>
+            </a:r>
+          </a:p>
+          <a:p>
             <a:endParaRPr lang="en-US" dirty="0"/>
           </a:p>
           <a:p>
-            <a:pPr lvl="1"/>
-            <a:r>
-              <a:rPr lang="en-US" dirty="0"/>
-              <a:t>Commands sent on socket</a:t>
-            </a:r>
-          </a:p>
-          <a:p>
-            <a:pPr lvl="1"/>
-            <a:r>
-              <a:rPr lang="en-US" dirty="0" err="1"/>
-              <a:t>NAudio</a:t>
-            </a:r>
-            <a:r>
-              <a:rPr lang="en-US" dirty="0"/>
-              <a:t> library</a:t>
-            </a:r>
+            <a:endParaRPr lang="en-US" dirty="0"/>
           </a:p>
         </p:txBody>
       </p:sp>
     </p:spTree>
     <p:extLst>
       <p:ext uri="{BB962C8B-B14F-4D97-AF65-F5344CB8AC3E}">
-        <p14:creationId xmlns:p14="http://schemas.microsoft.com/office/powerpoint/2010/main" val="1836196979"/>
+        <p14:creationId xmlns:p14="http://schemas.microsoft.com/office/powerpoint/2010/main" val="1799825062"/>
       </p:ext>
     </p:extLst>
   </p:cSld>
@@ -6722,6 +7188,163 @@
           <a:p>
             <a:r>
               <a:rPr lang="en-US" dirty="0"/>
+              <a:t>Graphical framebuffer</a:t>
+            </a:r>
+          </a:p>
+          <a:p>
+            <a:pPr lvl="1"/>
+            <a:r>
+              <a:rPr lang="en-US" dirty="0"/>
+              <a:t>/dev/fb0</a:t>
+            </a:r>
+          </a:p>
+          <a:p>
+            <a:pPr lvl="1"/>
+            <a:r>
+              <a:rPr lang="en-US" dirty="0"/>
+              <a:t>Originally the file was periodically read and presented</a:t>
+            </a:r>
+          </a:p>
+          <a:p>
+            <a:pPr lvl="1"/>
+            <a:r>
+              <a:rPr lang="en-US" dirty="0"/>
+              <a:t>Now sending memory content on a localhost socket</a:t>
+            </a:r>
+          </a:p>
+          <a:p>
+            <a:r>
+              <a:rPr lang="en-US" dirty="0"/>
+              <a:t>Sound</a:t>
+            </a:r>
+          </a:p>
+          <a:p>
+            <a:pPr lvl="1"/>
+            <a:r>
+              <a:rPr lang="en-US" dirty="0"/>
+              <a:t>ALSA calls</a:t>
+            </a:r>
+          </a:p>
+          <a:p>
+            <a:pPr lvl="1"/>
+            <a:r>
+              <a:rPr lang="en-US" dirty="0"/>
+              <a:t>PCM</a:t>
+            </a:r>
+          </a:p>
+          <a:p>
+            <a:pPr lvl="1"/>
+            <a:r>
+              <a:rPr lang="en-US" dirty="0"/>
+              <a:t>/dev/</a:t>
+            </a:r>
+            <a:r>
+              <a:rPr lang="en-US" dirty="0" err="1"/>
+              <a:t>snd</a:t>
+            </a:r>
+            <a:r>
+              <a:rPr lang="en-US" dirty="0"/>
+              <a:t>/controlC0, /dev/</a:t>
+            </a:r>
+            <a:r>
+              <a:rPr lang="en-US" dirty="0" err="1"/>
+              <a:t>snd</a:t>
+            </a:r>
+            <a:r>
+              <a:rPr lang="en-US"/>
+              <a:t>/pcmC0D0p</a:t>
+            </a:r>
+            <a:endParaRPr lang="en-US" dirty="0"/>
+          </a:p>
+          <a:p>
+            <a:pPr lvl="1"/>
+            <a:r>
+              <a:rPr lang="en-US" dirty="0"/>
+              <a:t>Commands sent on socket</a:t>
+            </a:r>
+          </a:p>
+          <a:p>
+            <a:pPr lvl="1"/>
+            <a:r>
+              <a:rPr lang="en-US" dirty="0" err="1"/>
+              <a:t>NAudio</a:t>
+            </a:r>
+            <a:r>
+              <a:rPr lang="en-US" dirty="0"/>
+              <a:t> library</a:t>
+            </a:r>
+          </a:p>
+        </p:txBody>
+      </p:sp>
+    </p:spTree>
+    <p:extLst>
+      <p:ext uri="{BB962C8B-B14F-4D97-AF65-F5344CB8AC3E}">
+        <p14:creationId xmlns:p14="http://schemas.microsoft.com/office/powerpoint/2010/main" val="1836196979"/>
+      </p:ext>
+    </p:extLst>
+  </p:cSld>
+  <p:clrMapOvr>
+    <a:masterClrMapping/>
+  </p:clrMapOvr>
+</p:sld>
+</file>
+
+<file path=ppt/slides/slide21.xml><?xml version="1.0" encoding="utf-8"?>
+<p:sld xmlns:a="http://schemas.openxmlformats.org/drawingml/2006/main" xmlns:r="http://schemas.openxmlformats.org/officeDocument/2006/relationships" xmlns:p="http://schemas.openxmlformats.org/presentationml/2006/main">
+  <p:cSld>
+    <p:spTree>
+      <p:nvGrpSpPr>
+        <p:cNvPr id="1" name=""/>
+        <p:cNvGrpSpPr/>
+        <p:nvPr/>
+      </p:nvGrpSpPr>
+      <p:grpSpPr>
+        <a:xfrm>
+          <a:off x="0" y="0"/>
+          <a:ext cx="0" cy="0"/>
+          <a:chOff x="0" y="0"/>
+          <a:chExt cx="0" cy="0"/>
+        </a:xfrm>
+      </p:grpSpPr>
+      <p:sp>
+        <p:nvSpPr>
+          <p:cNvPr id="2" name="Title 1"/>
+          <p:cNvSpPr>
+            <a:spLocks noGrp="1"/>
+          </p:cNvSpPr>
+          <p:nvPr>
+            <p:ph type="title"/>
+          </p:nvPr>
+        </p:nvSpPr>
+        <p:spPr/>
+        <p:txBody>
+          <a:bodyPr/>
+          <a:lstStyle/>
+          <a:p>
+            <a:r>
+              <a:rPr lang="en-US" dirty="0"/>
+              <a:t>How emulation works?</a:t>
+            </a:r>
+          </a:p>
+        </p:txBody>
+      </p:sp>
+      <p:sp>
+        <p:nvSpPr>
+          <p:cNvPr id="3" name="Content Placeholder 2"/>
+          <p:cNvSpPr>
+            <a:spLocks noGrp="1"/>
+          </p:cNvSpPr>
+          <p:nvPr>
+            <p:ph idx="1"/>
+          </p:nvPr>
+        </p:nvSpPr>
+        <p:spPr/>
+        <p:txBody>
+          <a:bodyPr/>
+          <a:lstStyle/>
+          <a:p>
+            <a:r>
+              <a:rPr lang="en-US" dirty="0"/>
               <a:t>Mouse</a:t>
             </a:r>
           </a:p>
@@ -6743,7 +7366,7 @@
             <a:pPr lvl="1"/>
             <a:r>
               <a:rPr lang="en-US" dirty="0"/>
-              <a:t>LWS side enquires the movement and buttons</a:t>
+              <a:t>LWS side enquires the movement and button state</a:t>
             </a:r>
           </a:p>
           <a:p>
@@ -6822,7 +7445,7 @@
 </p:sld>
 </file>
 
-<file path=ppt/slides/slide21.xml><?xml version="1.0" encoding="utf-8"?>
+<file path=ppt/slides/slide22.xml><?xml version="1.0" encoding="utf-8"?>
 <p:sld xmlns:a="http://schemas.openxmlformats.org/drawingml/2006/main" xmlns:r="http://schemas.openxmlformats.org/officeDocument/2006/relationships" xmlns:p="http://schemas.openxmlformats.org/presentationml/2006/main">
   <p:cSld>
     <p:spTree>
@@ -7052,12 +7675,8 @@
           </a:p>
           <a:p>
             <a:r>
-              <a:rPr lang="en-US" dirty="0" err="1"/>
-              <a:t>Posix</a:t>
-            </a:r>
-            <a:r>
-              <a:rPr lang="en-US" dirty="0"/>
-              <a:t> v1 support</a:t>
+              <a:rPr lang="en-US" dirty="0"/>
+              <a:t>POSIX v1 support</a:t>
             </a:r>
           </a:p>
           <a:p>
@@ -7271,7 +7890,7 @@
             </a:r>
             <a:r>
               <a:rPr lang="en-US" dirty="0" err="1"/>
-              <a:t>tools+server</a:t>
+              <a:t>tools+servers</a:t>
             </a:r>
             <a:endParaRPr lang="en-US" dirty="0"/>
           </a:p>
@@ -7329,7 +7948,7 @@
           <a:p>
             <a:r>
               <a:rPr lang="en-US" dirty="0"/>
-              <a:t>Other distributions can be hacked</a:t>
+              <a:t>Other distributions can be hacked onto</a:t>
             </a:r>
           </a:p>
         </p:txBody>
@@ -7618,7 +8237,7 @@
         <p:spPr>
           <a:xfrm>
             <a:off x="5948218" y="2087418"/>
-            <a:ext cx="2625399" cy="1200329"/>
+            <a:ext cx="2625399" cy="1754326"/>
           </a:xfrm>
           <a:prstGeom prst="rect">
             <a:avLst/>
@@ -7666,6 +8285,18 @@
               <a:t>syscalls</a:t>
             </a:r>
             <a:endParaRPr lang="en-US" dirty="0"/>
+          </a:p>
+          <a:p>
+            <a:r>
+              <a:rPr lang="en-US" dirty="0"/>
+              <a:t>-&gt;</a:t>
+            </a:r>
+          </a:p>
+          <a:p>
+            <a:r>
+              <a:rPr lang="en-US" dirty="0"/>
+              <a:t>SQL 2016 on Linux</a:t>
+            </a:r>
           </a:p>
         </p:txBody>
       </p:sp>

</xml_diff>

<commit_message>
Some early SzSzK2017 materials
</commit_message>
<xml_diff>
--- a/talks/entdev170222/EntDev170222_MSLovesLinux.pptx
+++ b/talks/entdev170222/EntDev170222_MSLovesLinux.pptx
@@ -218,7 +218,7 @@
           <a:p>
             <a:fld id="{FF887124-A3AA-467C-B375-1690662688A0}" type="datetimeFigureOut">
               <a:rPr lang="en-US" smtClean="0"/>
-              <a:t>2/16/2017</a:t>
+              <a:t>2/27/2017</a:t>
             </a:fld>
             <a:endParaRPr lang="en-US"/>
           </a:p>
@@ -953,7 +953,7 @@
           <a:p>
             <a:fld id="{20E7F039-6ACC-45DB-B329-DF29D647B5FB}" type="datetimeFigureOut">
               <a:rPr lang="en-US" smtClean="0"/>
-              <a:t>2/16/2017</a:t>
+              <a:t>2/27/2017</a:t>
             </a:fld>
             <a:endParaRPr lang="en-US"/>
           </a:p>
@@ -1121,7 +1121,7 @@
           <a:p>
             <a:fld id="{20E7F039-6ACC-45DB-B329-DF29D647B5FB}" type="datetimeFigureOut">
               <a:rPr lang="en-US" smtClean="0"/>
-              <a:t>2/16/2017</a:t>
+              <a:t>2/27/2017</a:t>
             </a:fld>
             <a:endParaRPr lang="en-US"/>
           </a:p>
@@ -1299,7 +1299,7 @@
           <a:p>
             <a:fld id="{20E7F039-6ACC-45DB-B329-DF29D647B5FB}" type="datetimeFigureOut">
               <a:rPr lang="en-US" smtClean="0"/>
-              <a:t>2/16/2017</a:t>
+              <a:t>2/27/2017</a:t>
             </a:fld>
             <a:endParaRPr lang="en-US"/>
           </a:p>
@@ -1467,7 +1467,7 @@
           <a:p>
             <a:fld id="{20E7F039-6ACC-45DB-B329-DF29D647B5FB}" type="datetimeFigureOut">
               <a:rPr lang="en-US" smtClean="0"/>
-              <a:t>2/16/2017</a:t>
+              <a:t>2/27/2017</a:t>
             </a:fld>
             <a:endParaRPr lang="en-US"/>
           </a:p>
@@ -1712,7 +1712,7 @@
           <a:p>
             <a:fld id="{20E7F039-6ACC-45DB-B329-DF29D647B5FB}" type="datetimeFigureOut">
               <a:rPr lang="en-US" smtClean="0"/>
-              <a:t>2/16/2017</a:t>
+              <a:t>2/27/2017</a:t>
             </a:fld>
             <a:endParaRPr lang="en-US"/>
           </a:p>
@@ -1941,7 +1941,7 @@
           <a:p>
             <a:fld id="{20E7F039-6ACC-45DB-B329-DF29D647B5FB}" type="datetimeFigureOut">
               <a:rPr lang="en-US" smtClean="0"/>
-              <a:t>2/16/2017</a:t>
+              <a:t>2/27/2017</a:t>
             </a:fld>
             <a:endParaRPr lang="en-US"/>
           </a:p>
@@ -2305,7 +2305,7 @@
           <a:p>
             <a:fld id="{20E7F039-6ACC-45DB-B329-DF29D647B5FB}" type="datetimeFigureOut">
               <a:rPr lang="en-US" smtClean="0"/>
-              <a:t>2/16/2017</a:t>
+              <a:t>2/27/2017</a:t>
             </a:fld>
             <a:endParaRPr lang="en-US"/>
           </a:p>
@@ -2422,7 +2422,7 @@
           <a:p>
             <a:fld id="{20E7F039-6ACC-45DB-B329-DF29D647B5FB}" type="datetimeFigureOut">
               <a:rPr lang="en-US" smtClean="0"/>
-              <a:t>2/16/2017</a:t>
+              <a:t>2/27/2017</a:t>
             </a:fld>
             <a:endParaRPr lang="en-US"/>
           </a:p>
@@ -2517,7 +2517,7 @@
           <a:p>
             <a:fld id="{20E7F039-6ACC-45DB-B329-DF29D647B5FB}" type="datetimeFigureOut">
               <a:rPr lang="en-US" smtClean="0"/>
-              <a:t>2/16/2017</a:t>
+              <a:t>2/27/2017</a:t>
             </a:fld>
             <a:endParaRPr lang="en-US"/>
           </a:p>
@@ -2792,7 +2792,7 @@
           <a:p>
             <a:fld id="{20E7F039-6ACC-45DB-B329-DF29D647B5FB}" type="datetimeFigureOut">
               <a:rPr lang="en-US" smtClean="0"/>
-              <a:t>2/16/2017</a:t>
+              <a:t>2/27/2017</a:t>
             </a:fld>
             <a:endParaRPr lang="en-US"/>
           </a:p>
@@ -3044,7 +3044,7 @@
           <a:p>
             <a:fld id="{20E7F039-6ACC-45DB-B329-DF29D647B5FB}" type="datetimeFigureOut">
               <a:rPr lang="en-US" smtClean="0"/>
-              <a:t>2/16/2017</a:t>
+              <a:t>2/27/2017</a:t>
             </a:fld>
             <a:endParaRPr lang="en-US"/>
           </a:p>
@@ -3255,7 +3255,7 @@
           <a:p>
             <a:fld id="{20E7F039-6ACC-45DB-B329-DF29D647B5FB}" type="datetimeFigureOut">
               <a:rPr lang="en-US" smtClean="0"/>
-              <a:t>2/16/2017</a:t>
+              <a:t>2/27/2017</a:t>
             </a:fld>
             <a:endParaRPr lang="en-US"/>
           </a:p>
@@ -4846,11 +4846,7 @@
             <a:pPr lvl="1"/>
             <a:r>
               <a:rPr lang="en-US" dirty="0"/>
-              <a:t>Socket - </a:t>
-            </a:r>
-            <a:r>
-              <a:rPr lang="en-US" dirty="0"/>
-              <a:t>TCP, UDP, RAW</a:t>
+              <a:t>Socket - TCP, UDP, RAW</a:t>
             </a:r>
           </a:p>
           <a:p>
@@ -7729,7 +7725,15 @@
           <a:p>
             <a:r>
               <a:rPr lang="en-US" dirty="0"/>
-              <a:t>LXSS, LWS, Ubuntu on Windows</a:t>
+              <a:t>LXSS</a:t>
+            </a:r>
+            <a:r>
+              <a:rPr lang="en-US"/>
+              <a:t>, WSL, </a:t>
+            </a:r>
+            <a:r>
+              <a:rPr lang="en-US" dirty="0"/>
+              <a:t>Ubuntu on Windows</a:t>
             </a:r>
           </a:p>
         </p:txBody>

</xml_diff>